<commit_message>
fix bolding in the fig-cephalosporins
</commit_message>
<xml_diff>
--- a/images/specific-drugs/fig-cephalosporins.pptx
+++ b/images/specific-drugs/fig-cephalosporins.pptx
@@ -197,7 +197,7 @@
           <a:p>
             <a:fld id="{44F68820-15DA-E246-8232-4232C9FF1A1A}" type="datetimeFigureOut">
               <a:rPr lang="en-US" smtClean="0"/>
-              <a:t>1/22/25</a:t>
+              <a:t>1/29/25</a:t>
             </a:fld>
             <a:endParaRPr lang="en-US"/>
           </a:p>
@@ -695,7 +695,7 @@
           <a:p>
             <a:fld id="{F423F859-1B0E-EA47-B4A0-661B5AB31C67}" type="datetimeFigureOut">
               <a:rPr lang="en-US" smtClean="0"/>
-              <a:t>1/22/25</a:t>
+              <a:t>1/29/25</a:t>
             </a:fld>
             <a:endParaRPr lang="en-US"/>
           </a:p>
@@ -893,7 +893,7 @@
           <a:p>
             <a:fld id="{F423F859-1B0E-EA47-B4A0-661B5AB31C67}" type="datetimeFigureOut">
               <a:rPr lang="en-US" smtClean="0"/>
-              <a:t>1/22/25</a:t>
+              <a:t>1/29/25</a:t>
             </a:fld>
             <a:endParaRPr lang="en-US"/>
           </a:p>
@@ -1101,7 +1101,7 @@
           <a:p>
             <a:fld id="{F423F859-1B0E-EA47-B4A0-661B5AB31C67}" type="datetimeFigureOut">
               <a:rPr lang="en-US" smtClean="0"/>
-              <a:t>1/22/25</a:t>
+              <a:t>1/29/25</a:t>
             </a:fld>
             <a:endParaRPr lang="en-US"/>
           </a:p>
@@ -1299,7 +1299,7 @@
           <a:p>
             <a:fld id="{F423F859-1B0E-EA47-B4A0-661B5AB31C67}" type="datetimeFigureOut">
               <a:rPr lang="en-US" smtClean="0"/>
-              <a:t>1/22/25</a:t>
+              <a:t>1/29/25</a:t>
             </a:fld>
             <a:endParaRPr lang="en-US"/>
           </a:p>
@@ -1574,7 +1574,7 @@
           <a:p>
             <a:fld id="{F423F859-1B0E-EA47-B4A0-661B5AB31C67}" type="datetimeFigureOut">
               <a:rPr lang="en-US" smtClean="0"/>
-              <a:t>1/22/25</a:t>
+              <a:t>1/29/25</a:t>
             </a:fld>
             <a:endParaRPr lang="en-US"/>
           </a:p>
@@ -1839,7 +1839,7 @@
           <a:p>
             <a:fld id="{F423F859-1B0E-EA47-B4A0-661B5AB31C67}" type="datetimeFigureOut">
               <a:rPr lang="en-US" smtClean="0"/>
-              <a:t>1/22/25</a:t>
+              <a:t>1/29/25</a:t>
             </a:fld>
             <a:endParaRPr lang="en-US"/>
           </a:p>
@@ -2251,7 +2251,7 @@
           <a:p>
             <a:fld id="{F423F859-1B0E-EA47-B4A0-661B5AB31C67}" type="datetimeFigureOut">
               <a:rPr lang="en-US" smtClean="0"/>
-              <a:t>1/22/25</a:t>
+              <a:t>1/29/25</a:t>
             </a:fld>
             <a:endParaRPr lang="en-US"/>
           </a:p>
@@ -2392,7 +2392,7 @@
           <a:p>
             <a:fld id="{F423F859-1B0E-EA47-B4A0-661B5AB31C67}" type="datetimeFigureOut">
               <a:rPr lang="en-US" smtClean="0"/>
-              <a:t>1/22/25</a:t>
+              <a:t>1/29/25</a:t>
             </a:fld>
             <a:endParaRPr lang="en-US"/>
           </a:p>
@@ -2505,7 +2505,7 @@
           <a:p>
             <a:fld id="{F423F859-1B0E-EA47-B4A0-661B5AB31C67}" type="datetimeFigureOut">
               <a:rPr lang="en-US" smtClean="0"/>
-              <a:t>1/22/25</a:t>
+              <a:t>1/29/25</a:t>
             </a:fld>
             <a:endParaRPr lang="en-US"/>
           </a:p>
@@ -2816,7 +2816,7 @@
           <a:p>
             <a:fld id="{F423F859-1B0E-EA47-B4A0-661B5AB31C67}" type="datetimeFigureOut">
               <a:rPr lang="en-US" smtClean="0"/>
-              <a:t>1/22/25</a:t>
+              <a:t>1/29/25</a:t>
             </a:fld>
             <a:endParaRPr lang="en-US"/>
           </a:p>
@@ -3104,7 +3104,7 @@
           <a:p>
             <a:fld id="{F423F859-1B0E-EA47-B4A0-661B5AB31C67}" type="datetimeFigureOut">
               <a:rPr lang="en-US" smtClean="0"/>
-              <a:t>1/22/25</a:t>
+              <a:t>1/29/25</a:t>
             </a:fld>
             <a:endParaRPr lang="en-US"/>
           </a:p>
@@ -3345,7 +3345,7 @@
           <a:p>
             <a:fld id="{F423F859-1B0E-EA47-B4A0-661B5AB31C67}" type="datetimeFigureOut">
               <a:rPr lang="en-US" smtClean="0"/>
-              <a:t>1/22/25</a:t>
+              <a:t>1/29/25</a:t>
             </a:fld>
             <a:endParaRPr lang="en-US"/>
           </a:p>
@@ -3762,6 +3762,58 @@
           <a:chExt cx="0" cy="0"/>
         </a:xfrm>
       </p:grpSpPr>
+      <p:sp>
+        <p:nvSpPr>
+          <p:cNvPr id="2" name="Rectangle 1">
+            <a:extLst>
+              <a:ext uri="{FF2B5EF4-FFF2-40B4-BE49-F238E27FC236}">
+                <a16:creationId xmlns:a16="http://schemas.microsoft.com/office/drawing/2014/main" id="{6B2228A3-CA39-B8CE-2519-6D9CB26DA7EE}"/>
+              </a:ext>
+            </a:extLst>
+          </p:cNvPr>
+          <p:cNvSpPr/>
+          <p:nvPr/>
+        </p:nvSpPr>
+        <p:spPr>
+          <a:xfrm>
+            <a:off x="3508545" y="667153"/>
+            <a:ext cx="4736812" cy="5293031"/>
+          </a:xfrm>
+          <a:prstGeom prst="rect">
+            <a:avLst/>
+          </a:prstGeom>
+          <a:solidFill>
+            <a:schemeClr val="bg1"/>
+          </a:solidFill>
+          <a:ln>
+            <a:noFill/>
+          </a:ln>
+        </p:spPr>
+        <p:style>
+          <a:lnRef idx="2">
+            <a:schemeClr val="accent1">
+              <a:shade val="15000"/>
+            </a:schemeClr>
+          </a:lnRef>
+          <a:fillRef idx="1">
+            <a:schemeClr val="accent1"/>
+          </a:fillRef>
+          <a:effectRef idx="0">
+            <a:schemeClr val="accent1"/>
+          </a:effectRef>
+          <a:fontRef idx="minor">
+            <a:schemeClr val="lt1"/>
+          </a:fontRef>
+        </p:style>
+        <p:txBody>
+          <a:bodyPr rtlCol="0" anchor="ctr"/>
+          <a:lstStyle/>
+          <a:p>
+            <a:pPr algn="ctr"/>
+            <a:endParaRPr lang="en-US"/>
+          </a:p>
+        </p:txBody>
+      </p:sp>
       <p:graphicFrame>
         <p:nvGraphicFramePr>
           <p:cNvPr id="5" name="Table 4">
@@ -3777,7 +3829,7 @@
           <p:nvPr>
             <p:extLst>
               <p:ext uri="{D42A27DB-BD31-4B8C-83A1-F6EECF244321}">
-                <p14:modId xmlns:p14="http://schemas.microsoft.com/office/powerpoint/2010/main" val="1652391311"/>
+                <p14:modId xmlns:p14="http://schemas.microsoft.com/office/powerpoint/2010/main" val="2691777362"/>
               </p:ext>
             </p:extLst>
           </p:nvPr>
@@ -10733,7 +10785,7 @@
                     <a:p>
                       <a:pPr algn="ctr"/>
                       <a:r>
-                        <a:rPr lang="en-US" sz="800" dirty="0">
+                        <a:rPr lang="en-US" sz="800" b="1" dirty="0">
                           <a:latin typeface="Arial" panose="020B0604020202020204" pitchFamily="34" charset="0"/>
                           <a:cs typeface="Arial" panose="020B0604020202020204" pitchFamily="34" charset="0"/>
                         </a:rPr>

</xml_diff>